<commit_message>
añadido convocatoria al poster
</commit_message>
<xml_diff>
--- a/doc/docs/cartel.pptx
+++ b/doc/docs/cartel.pptx
@@ -254,7 +254,7 @@
           <a:p>
             <a:fld id="{8172BD3B-D14C-40E0-B9CC-2A3BC8453C03}" type="datetimeFigureOut">
               <a:rPr lang="es-ES" smtClean="0"/>
-              <a:t>03/07/2017</a:t>
+              <a:t>04/07/2017</a:t>
             </a:fld>
             <a:endParaRPr lang="es-ES"/>
           </a:p>
@@ -424,7 +424,7 @@
           <a:p>
             <a:fld id="{8172BD3B-D14C-40E0-B9CC-2A3BC8453C03}" type="datetimeFigureOut">
               <a:rPr lang="es-ES" smtClean="0"/>
-              <a:t>03/07/2017</a:t>
+              <a:t>04/07/2017</a:t>
             </a:fld>
             <a:endParaRPr lang="es-ES"/>
           </a:p>
@@ -604,7 +604,7 @@
           <a:p>
             <a:fld id="{8172BD3B-D14C-40E0-B9CC-2A3BC8453C03}" type="datetimeFigureOut">
               <a:rPr lang="es-ES" smtClean="0"/>
-              <a:t>03/07/2017</a:t>
+              <a:t>04/07/2017</a:t>
             </a:fld>
             <a:endParaRPr lang="es-ES"/>
           </a:p>
@@ -774,7 +774,7 @@
           <a:p>
             <a:fld id="{8172BD3B-D14C-40E0-B9CC-2A3BC8453C03}" type="datetimeFigureOut">
               <a:rPr lang="es-ES" smtClean="0"/>
-              <a:t>03/07/2017</a:t>
+              <a:t>04/07/2017</a:t>
             </a:fld>
             <a:endParaRPr lang="es-ES"/>
           </a:p>
@@ -1018,7 +1018,7 @@
           <a:p>
             <a:fld id="{8172BD3B-D14C-40E0-B9CC-2A3BC8453C03}" type="datetimeFigureOut">
               <a:rPr lang="es-ES" smtClean="0"/>
-              <a:t>03/07/2017</a:t>
+              <a:t>04/07/2017</a:t>
             </a:fld>
             <a:endParaRPr lang="es-ES"/>
           </a:p>
@@ -1250,7 +1250,7 @@
           <a:p>
             <a:fld id="{8172BD3B-D14C-40E0-B9CC-2A3BC8453C03}" type="datetimeFigureOut">
               <a:rPr lang="es-ES" smtClean="0"/>
-              <a:t>03/07/2017</a:t>
+              <a:t>04/07/2017</a:t>
             </a:fld>
             <a:endParaRPr lang="es-ES"/>
           </a:p>
@@ -1617,7 +1617,7 @@
           <a:p>
             <a:fld id="{8172BD3B-D14C-40E0-B9CC-2A3BC8453C03}" type="datetimeFigureOut">
               <a:rPr lang="es-ES" smtClean="0"/>
-              <a:t>03/07/2017</a:t>
+              <a:t>04/07/2017</a:t>
             </a:fld>
             <a:endParaRPr lang="es-ES"/>
           </a:p>
@@ -1735,7 +1735,7 @@
           <a:p>
             <a:fld id="{8172BD3B-D14C-40E0-B9CC-2A3BC8453C03}" type="datetimeFigureOut">
               <a:rPr lang="es-ES" smtClean="0"/>
-              <a:t>03/07/2017</a:t>
+              <a:t>04/07/2017</a:t>
             </a:fld>
             <a:endParaRPr lang="es-ES"/>
           </a:p>
@@ -1830,7 +1830,7 @@
           <a:p>
             <a:fld id="{8172BD3B-D14C-40E0-B9CC-2A3BC8453C03}" type="datetimeFigureOut">
               <a:rPr lang="es-ES" smtClean="0"/>
-              <a:t>03/07/2017</a:t>
+              <a:t>04/07/2017</a:t>
             </a:fld>
             <a:endParaRPr lang="es-ES"/>
           </a:p>
@@ -2107,7 +2107,7 @@
           <a:p>
             <a:fld id="{8172BD3B-D14C-40E0-B9CC-2A3BC8453C03}" type="datetimeFigureOut">
               <a:rPr lang="es-ES" smtClean="0"/>
-              <a:t>03/07/2017</a:t>
+              <a:t>04/07/2017</a:t>
             </a:fld>
             <a:endParaRPr lang="es-ES"/>
           </a:p>
@@ -2364,7 +2364,7 @@
           <a:p>
             <a:fld id="{8172BD3B-D14C-40E0-B9CC-2A3BC8453C03}" type="datetimeFigureOut">
               <a:rPr lang="es-ES" smtClean="0"/>
-              <a:t>03/07/2017</a:t>
+              <a:t>04/07/2017</a:t>
             </a:fld>
             <a:endParaRPr lang="es-ES"/>
           </a:p>
@@ -2602,7 +2602,7 @@
           <a:p>
             <a:fld id="{8172BD3B-D14C-40E0-B9CC-2A3BC8453C03}" type="datetimeFigureOut">
               <a:rPr lang="es-ES" smtClean="0"/>
-              <a:t>03/07/2017</a:t>
+              <a:t>04/07/2017</a:t>
             </a:fld>
             <a:endParaRPr lang="es-ES"/>
           </a:p>
@@ -3072,7 +3072,7 @@
           <a:graphicData uri="http://schemas.openxmlformats.org/presentationml/2006/ole">
             <mc:AlternateContent xmlns:mc="http://schemas.openxmlformats.org/markup-compatibility/2006">
               <mc:Choice xmlns:v="urn:schemas-microsoft-com:vml" Requires="v">
-                <p:oleObj spid="_x0000_s1045" name="Acrobat Document" r:id="rId4" imgW="4685981" imgH="1028487" progId="Acrobat.Document.DC">
+                <p:oleObj spid="_x0000_s1046" name="Acrobat Document" r:id="rId4" imgW="4685981" imgH="1028487" progId="Acrobat.Document.DC">
                   <p:embed/>
                 </p:oleObj>
               </mc:Choice>
@@ -3928,7 +3928,7 @@
           <a:lstStyle/>
           <a:p>
             <a:pPr algn="ctr"/>
-            <a:endParaRPr lang="es-ES"/>
+            <a:endParaRPr lang="es-ES" dirty="0"/>
           </a:p>
         </p:txBody>
       </p:sp>
@@ -4020,7 +4020,7 @@
         </p:blipFill>
         <p:spPr>
           <a:xfrm>
-            <a:off x="25258407" y="38616225"/>
+            <a:off x="25114647" y="37670594"/>
             <a:ext cx="3733333" cy="3733333"/>
           </a:xfrm>
           <a:prstGeom prst="rect">
@@ -4964,6 +4964,56 @@
               <a:t>Web service</a:t>
             </a:r>
             <a:endParaRPr lang="es-ES" dirty="0"/>
+          </a:p>
+        </p:txBody>
+      </p:sp>
+      <p:sp>
+        <p:nvSpPr>
+          <p:cNvPr id="27" name="CuadroTexto 26"/>
+          <p:cNvSpPr txBox="1"/>
+          <p:nvPr/>
+        </p:nvSpPr>
+        <p:spPr>
+          <a:xfrm>
+            <a:off x="25682232" y="41574504"/>
+            <a:ext cx="2598161" cy="1200329"/>
+          </a:xfrm>
+          <a:prstGeom prst="rect">
+            <a:avLst/>
+          </a:prstGeom>
+          <a:noFill/>
+          <a:effectLst>
+            <a:glow rad="25400">
+              <a:schemeClr val="accent1">
+                <a:alpha val="40000"/>
+              </a:schemeClr>
+            </a:glow>
+            <a:reflection blurRad="25400" endPos="0" dist="50800" dir="5400000" sy="-100000" algn="bl" rotWithShape="0"/>
+            <a:softEdge rad="0"/>
+          </a:effectLst>
+        </p:spPr>
+        <p:txBody>
+          <a:bodyPr wrap="square" rtlCol="0">
+            <a:spAutoFit/>
+          </a:bodyPr>
+          <a:lstStyle/>
+          <a:p>
+            <a:pPr algn="ctr"/>
+            <a:r>
+              <a:rPr lang="es-ES" sz="7200" b="1" dirty="0">
+                <a:solidFill>
+                  <a:schemeClr val="bg1"/>
+                </a:solidFill>
+                <a:effectLst>
+                  <a:outerShdw blurRad="38100" dist="38100" dir="2700000" algn="tl">
+                    <a:srgbClr val="000000">
+                      <a:alpha val="43137"/>
+                    </a:srgbClr>
+                  </a:outerShdw>
+                </a:effectLst>
+              </a:rPr>
+              <a:t>Julio</a:t>
+            </a:r>
           </a:p>
         </p:txBody>
       </p:sp>

</xml_diff>